<commit_message>
Added changes from Amanda.
</commit_message>
<xml_diff>
--- a/week1/week1.pptx
+++ b/week1/week1.pptx
@@ -122,6 +122,11 @@
       </a:defRPr>
     </a:lvl9pPr>
   </p:defaultTextStyle>
+  <p:extLst>
+    <p:ext uri="{EFAFB233-063F-42B5-8137-9DF3F51BA10A}">
+      <p15:sldGuideLst xmlns:p15="http://schemas.microsoft.com/office/powerpoint/2012/main"/>
+    </p:ext>
+  </p:extLst>
 </p:presentation>
 </file>
 
@@ -167,7 +172,7 @@
           </a:lstStyle>
           <a:p>
             <a:r>
-              <a:rPr lang="en-US" smtClean="0"/>
+              <a:rPr lang="en-US"/>
               <a:t>Click to edit Master title style</a:t>
             </a:r>
             <a:endParaRPr lang="en-US" dirty="0"/>
@@ -287,7 +292,7 @@
           </a:lstStyle>
           <a:p>
             <a:r>
-              <a:rPr lang="en-US" smtClean="0"/>
+              <a:rPr lang="en-US"/>
               <a:t>Click to edit Master subtitle style</a:t>
             </a:r>
             <a:endParaRPr lang="en-US" dirty="0"/>
@@ -311,7 +316,7 @@
           <a:p>
             <a:fld id="{4AAD347D-5ACD-4C99-B74B-A9C85AD731AF}" type="datetimeFigureOut">
               <a:rPr lang="en-US" dirty="0"/>
-              <a:t>2/27/2018</a:t>
+              <a:t>3/2/2018</a:t>
             </a:fld>
             <a:endParaRPr lang="en-US" dirty="0"/>
           </a:p>
@@ -411,7 +416,7 @@
           </a:lstStyle>
           <a:p>
             <a:r>
-              <a:rPr lang="en-US" smtClean="0"/>
+              <a:rPr lang="en-US"/>
               <a:t>Click to edit Master title style</a:t>
             </a:r>
             <a:endParaRPr lang="en-US" dirty="0"/>
@@ -490,7 +495,7 @@
           </a:lstStyle>
           <a:p>
             <a:r>
-              <a:rPr lang="en-US" smtClean="0"/>
+              <a:rPr lang="en-US"/>
               <a:t>Click icon to add picture</a:t>
             </a:r>
             <a:endParaRPr lang="en-US" dirty="0"/>
@@ -558,7 +563,7 @@
           <a:p>
             <a:pPr lvl="0"/>
             <a:r>
-              <a:rPr lang="en-US" smtClean="0"/>
+              <a:rPr lang="en-US"/>
               <a:t>Click to edit Master text styles</a:t>
             </a:r>
           </a:p>
@@ -581,7 +586,7 @@
           <a:p>
             <a:fld id="{4509A250-FF31-4206-8172-F9D3106AACB1}" type="datetimeFigureOut">
               <a:rPr lang="en-US" dirty="0"/>
-              <a:t>2/27/2018</a:t>
+              <a:t>3/2/2018</a:t>
             </a:fld>
             <a:endParaRPr lang="en-US" dirty="0"/>
           </a:p>
@@ -679,7 +684,7 @@
           </a:lstStyle>
           <a:p>
             <a:r>
-              <a:rPr lang="en-US" smtClean="0"/>
+              <a:rPr lang="en-US"/>
               <a:t>Click to edit Master title style</a:t>
             </a:r>
             <a:endParaRPr lang="en-US" dirty="0"/>
@@ -747,7 +752,7 @@
           <a:p>
             <a:pPr lvl="0"/>
             <a:r>
-              <a:rPr lang="en-US" smtClean="0"/>
+              <a:rPr lang="en-US"/>
               <a:t>Click to edit Master text styles</a:t>
             </a:r>
           </a:p>
@@ -770,7 +775,7 @@
           <a:p>
             <a:fld id="{4509A250-FF31-4206-8172-F9D3106AACB1}" type="datetimeFigureOut">
               <a:rPr lang="en-US" dirty="0"/>
-              <a:t>2/27/2018</a:t>
+              <a:t>3/2/2018</a:t>
             </a:fld>
             <a:endParaRPr lang="en-US" dirty="0"/>
           </a:p>
@@ -868,7 +873,7 @@
           </a:lstStyle>
           <a:p>
             <a:r>
-              <a:rPr lang="en-US" smtClean="0"/>
+              <a:rPr lang="en-US"/>
               <a:t>Click to edit Master title style</a:t>
             </a:r>
             <a:endParaRPr lang="en-US" dirty="0"/>
@@ -948,7 +953,7 @@
               <a:buNone/>
             </a:pPr>
             <a:r>
-              <a:rPr lang="en-US" smtClean="0"/>
+              <a:rPr lang="en-US"/>
               <a:t>Click to edit Master text styles</a:t>
             </a:r>
           </a:p>
@@ -1015,7 +1020,7 @@
           <a:p>
             <a:pPr lvl="0"/>
             <a:r>
-              <a:rPr lang="en-US" smtClean="0"/>
+              <a:rPr lang="en-US"/>
               <a:t>Click to edit Master text styles</a:t>
             </a:r>
           </a:p>
@@ -1038,7 +1043,7 @@
           <a:p>
             <a:fld id="{4509A250-FF31-4206-8172-F9D3106AACB1}" type="datetimeFigureOut">
               <a:rPr lang="en-US" dirty="0"/>
-              <a:t>2/27/2018</a:t>
+              <a:t>3/2/2018</a:t>
             </a:fld>
             <a:endParaRPr lang="en-US" dirty="0"/>
           </a:p>
@@ -1230,7 +1235,7 @@
           </a:lstStyle>
           <a:p>
             <a:r>
-              <a:rPr lang="en-US" smtClean="0"/>
+              <a:rPr lang="en-US"/>
               <a:t>Click to edit Master title style</a:t>
             </a:r>
             <a:endParaRPr lang="en-US" dirty="0"/>
@@ -1351,7 +1356,7 @@
           <a:p>
             <a:pPr lvl="0"/>
             <a:r>
-              <a:rPr lang="en-US" smtClean="0"/>
+              <a:rPr lang="en-US"/>
               <a:t>Click to edit Master text styles</a:t>
             </a:r>
           </a:p>
@@ -1374,7 +1379,7 @@
           <a:p>
             <a:fld id="{4509A250-FF31-4206-8172-F9D3106AACB1}" type="datetimeFigureOut">
               <a:rPr lang="en-US" dirty="0"/>
-              <a:t>2/27/2018</a:t>
+              <a:t>3/2/2018</a:t>
             </a:fld>
             <a:endParaRPr lang="en-US" dirty="0"/>
           </a:p>
@@ -1467,7 +1472,7 @@
           </a:lstStyle>
           <a:p>
             <a:r>
-              <a:rPr lang="en-US" smtClean="0"/>
+              <a:rPr lang="en-US"/>
               <a:t>Click to edit Master title style</a:t>
             </a:r>
             <a:endParaRPr lang="en-US" dirty="0"/>
@@ -1542,7 +1547,7 @@
           <a:p>
             <a:pPr lvl="0"/>
             <a:r>
-              <a:rPr lang="en-US" smtClean="0"/>
+              <a:rPr lang="en-US"/>
               <a:t>Click to edit Master text styles</a:t>
             </a:r>
           </a:p>
@@ -1609,7 +1614,7 @@
           <a:p>
             <a:pPr lvl="0"/>
             <a:r>
-              <a:rPr lang="en-US" smtClean="0"/>
+              <a:rPr lang="en-US"/>
               <a:t>Click to edit Master text styles</a:t>
             </a:r>
           </a:p>
@@ -1683,7 +1688,7 @@
           <a:p>
             <a:pPr lvl="0"/>
             <a:r>
-              <a:rPr lang="en-US" smtClean="0"/>
+              <a:rPr lang="en-US"/>
               <a:t>Click to edit Master text styles</a:t>
             </a:r>
           </a:p>
@@ -1750,7 +1755,7 @@
           <a:p>
             <a:pPr lvl="0"/>
             <a:r>
-              <a:rPr lang="en-US" smtClean="0"/>
+              <a:rPr lang="en-US"/>
               <a:t>Click to edit Master text styles</a:t>
             </a:r>
           </a:p>
@@ -1824,7 +1829,7 @@
           <a:p>
             <a:pPr lvl="0"/>
             <a:r>
-              <a:rPr lang="en-US" smtClean="0"/>
+              <a:rPr lang="en-US"/>
               <a:t>Click to edit Master text styles</a:t>
             </a:r>
           </a:p>
@@ -1891,7 +1896,7 @@
           <a:p>
             <a:pPr lvl="0"/>
             <a:r>
-              <a:rPr lang="en-US" smtClean="0"/>
+              <a:rPr lang="en-US"/>
               <a:t>Click to edit Master text styles</a:t>
             </a:r>
           </a:p>
@@ -1992,7 +1997,7 @@
           <a:p>
             <a:fld id="{4509A250-FF31-4206-8172-F9D3106AACB1}" type="datetimeFigureOut">
               <a:rPr lang="en-US" dirty="0"/>
-              <a:t>2/27/2018</a:t>
+              <a:t>3/2/2018</a:t>
             </a:fld>
             <a:endParaRPr lang="en-US" dirty="0"/>
           </a:p>
@@ -2085,7 +2090,7 @@
           </a:lstStyle>
           <a:p>
             <a:r>
-              <a:rPr lang="en-US" smtClean="0"/>
+              <a:rPr lang="en-US"/>
               <a:t>Click to edit Master title style</a:t>
             </a:r>
             <a:endParaRPr lang="en-US" dirty="0"/>
@@ -2160,7 +2165,7 @@
           <a:p>
             <a:pPr lvl="0"/>
             <a:r>
-              <a:rPr lang="en-US" smtClean="0"/>
+              <a:rPr lang="en-US"/>
               <a:t>Click to edit Master text styles</a:t>
             </a:r>
           </a:p>
@@ -2238,7 +2243,7 @@
           </a:lstStyle>
           <a:p>
             <a:r>
-              <a:rPr lang="en-US" smtClean="0"/>
+              <a:rPr lang="en-US"/>
               <a:t>Click icon to add picture</a:t>
             </a:r>
             <a:endParaRPr lang="en-US" dirty="0"/>
@@ -2306,7 +2311,7 @@
           <a:p>
             <a:pPr lvl="0"/>
             <a:r>
-              <a:rPr lang="en-US" smtClean="0"/>
+              <a:rPr lang="en-US"/>
               <a:t>Click to edit Master text styles</a:t>
             </a:r>
           </a:p>
@@ -2380,7 +2385,7 @@
           <a:p>
             <a:pPr lvl="0"/>
             <a:r>
-              <a:rPr lang="en-US" smtClean="0"/>
+              <a:rPr lang="en-US"/>
               <a:t>Click to edit Master text styles</a:t>
             </a:r>
           </a:p>
@@ -2458,7 +2463,7 @@
           </a:lstStyle>
           <a:p>
             <a:r>
-              <a:rPr lang="en-US" smtClean="0"/>
+              <a:rPr lang="en-US"/>
               <a:t>Click icon to add picture</a:t>
             </a:r>
             <a:endParaRPr lang="en-US" dirty="0"/>
@@ -2526,7 +2531,7 @@
           <a:p>
             <a:pPr lvl="0"/>
             <a:r>
-              <a:rPr lang="en-US" smtClean="0"/>
+              <a:rPr lang="en-US"/>
               <a:t>Click to edit Master text styles</a:t>
             </a:r>
           </a:p>
@@ -2600,7 +2605,7 @@
           <a:p>
             <a:pPr lvl="0"/>
             <a:r>
-              <a:rPr lang="en-US" smtClean="0"/>
+              <a:rPr lang="en-US"/>
               <a:t>Click to edit Master text styles</a:t>
             </a:r>
           </a:p>
@@ -2678,7 +2683,7 @@
           </a:lstStyle>
           <a:p>
             <a:r>
-              <a:rPr lang="en-US" smtClean="0"/>
+              <a:rPr lang="en-US"/>
               <a:t>Click icon to add picture</a:t>
             </a:r>
             <a:endParaRPr lang="en-US" dirty="0"/>
@@ -2746,7 +2751,7 @@
           <a:p>
             <a:pPr lvl="0"/>
             <a:r>
-              <a:rPr lang="en-US" smtClean="0"/>
+              <a:rPr lang="en-US"/>
               <a:t>Click to edit Master text styles</a:t>
             </a:r>
           </a:p>
@@ -2847,7 +2852,7 @@
           <a:p>
             <a:fld id="{4509A250-FF31-4206-8172-F9D3106AACB1}" type="datetimeFigureOut">
               <a:rPr lang="en-US" dirty="0"/>
-              <a:t>2/27/2018</a:t>
+              <a:t>3/2/2018</a:t>
             </a:fld>
             <a:endParaRPr lang="en-US" dirty="0"/>
           </a:p>
@@ -2936,7 +2941,7 @@
           <a:lstStyle/>
           <a:p>
             <a:r>
-              <a:rPr lang="en-US" smtClean="0"/>
+              <a:rPr lang="en-US"/>
               <a:t>Click to edit Master title style</a:t>
             </a:r>
             <a:endParaRPr lang="en-US" dirty="0"/>
@@ -2960,35 +2965,35 @@
           <a:p>
             <a:pPr lvl="0"/>
             <a:r>
-              <a:rPr lang="en-US" smtClean="0"/>
+              <a:rPr lang="en-US"/>
               <a:t>Click to edit Master text styles</a:t>
             </a:r>
           </a:p>
           <a:p>
             <a:pPr lvl="1"/>
             <a:r>
-              <a:rPr lang="en-US" smtClean="0"/>
+              <a:rPr lang="en-US"/>
               <a:t>Second level</a:t>
             </a:r>
           </a:p>
           <a:p>
             <a:pPr lvl="2"/>
             <a:r>
-              <a:rPr lang="en-US" smtClean="0"/>
+              <a:rPr lang="en-US"/>
               <a:t>Third level</a:t>
             </a:r>
           </a:p>
           <a:p>
             <a:pPr lvl="3"/>
             <a:r>
-              <a:rPr lang="en-US" smtClean="0"/>
+              <a:rPr lang="en-US"/>
               <a:t>Fourth level</a:t>
             </a:r>
           </a:p>
           <a:p>
             <a:pPr lvl="4"/>
             <a:r>
-              <a:rPr lang="en-US" smtClean="0"/>
+              <a:rPr lang="en-US"/>
               <a:t>Fifth level</a:t>
             </a:r>
             <a:endParaRPr lang="en-US" dirty="0"/>
@@ -3012,7 +3017,7 @@
           <a:p>
             <a:fld id="{4509A250-FF31-4206-8172-F9D3106AACB1}" type="datetimeFigureOut">
               <a:rPr lang="en-US" dirty="0"/>
-              <a:t>2/27/2018</a:t>
+              <a:t>3/2/2018</a:t>
             </a:fld>
             <a:endParaRPr lang="en-US" dirty="0"/>
           </a:p>
@@ -3106,7 +3111,7 @@
           <a:lstStyle/>
           <a:p>
             <a:r>
-              <a:rPr lang="en-US" smtClean="0"/>
+              <a:rPr lang="en-US"/>
               <a:t>Click to edit Master title style</a:t>
             </a:r>
             <a:endParaRPr lang="en-US" dirty="0"/>
@@ -3135,35 +3140,35 @@
           <a:p>
             <a:pPr lvl="0"/>
             <a:r>
-              <a:rPr lang="en-US" smtClean="0"/>
+              <a:rPr lang="en-US"/>
               <a:t>Click to edit Master text styles</a:t>
             </a:r>
           </a:p>
           <a:p>
             <a:pPr lvl="1"/>
             <a:r>
-              <a:rPr lang="en-US" smtClean="0"/>
+              <a:rPr lang="en-US"/>
               <a:t>Second level</a:t>
             </a:r>
           </a:p>
           <a:p>
             <a:pPr lvl="2"/>
             <a:r>
-              <a:rPr lang="en-US" smtClean="0"/>
+              <a:rPr lang="en-US"/>
               <a:t>Third level</a:t>
             </a:r>
           </a:p>
           <a:p>
             <a:pPr lvl="3"/>
             <a:r>
-              <a:rPr lang="en-US" smtClean="0"/>
+              <a:rPr lang="en-US"/>
               <a:t>Fourth level</a:t>
             </a:r>
           </a:p>
           <a:p>
             <a:pPr lvl="4"/>
             <a:r>
-              <a:rPr lang="en-US" smtClean="0"/>
+              <a:rPr lang="en-US"/>
               <a:t>Fifth level</a:t>
             </a:r>
             <a:endParaRPr lang="en-US" dirty="0"/>
@@ -3187,7 +3192,7 @@
           <a:p>
             <a:fld id="{4509A250-FF31-4206-8172-F9D3106AACB1}" type="datetimeFigureOut">
               <a:rPr lang="en-US" dirty="0"/>
-              <a:t>2/27/2018</a:t>
+              <a:t>3/2/2018</a:t>
             </a:fld>
             <a:endParaRPr lang="en-US" dirty="0"/>
           </a:p>
@@ -3276,7 +3281,7 @@
           <a:lstStyle/>
           <a:p>
             <a:r>
-              <a:rPr lang="en-US" smtClean="0"/>
+              <a:rPr lang="en-US"/>
               <a:t>Click to edit Master title style</a:t>
             </a:r>
             <a:endParaRPr lang="en-US" dirty="0"/>
@@ -3300,35 +3305,35 @@
           <a:p>
             <a:pPr lvl="0"/>
             <a:r>
-              <a:rPr lang="en-US" smtClean="0"/>
+              <a:rPr lang="en-US"/>
               <a:t>Click to edit Master text styles</a:t>
             </a:r>
           </a:p>
           <a:p>
             <a:pPr lvl="1"/>
             <a:r>
-              <a:rPr lang="en-US" smtClean="0"/>
+              <a:rPr lang="en-US"/>
               <a:t>Second level</a:t>
             </a:r>
           </a:p>
           <a:p>
             <a:pPr lvl="2"/>
             <a:r>
-              <a:rPr lang="en-US" smtClean="0"/>
+              <a:rPr lang="en-US"/>
               <a:t>Third level</a:t>
             </a:r>
           </a:p>
           <a:p>
             <a:pPr lvl="3"/>
             <a:r>
-              <a:rPr lang="en-US" smtClean="0"/>
+              <a:rPr lang="en-US"/>
               <a:t>Fourth level</a:t>
             </a:r>
           </a:p>
           <a:p>
             <a:pPr lvl="4"/>
             <a:r>
-              <a:rPr lang="en-US" smtClean="0"/>
+              <a:rPr lang="en-US"/>
               <a:t>Fifth level</a:t>
             </a:r>
             <a:endParaRPr lang="en-US" dirty="0"/>
@@ -3352,7 +3357,7 @@
           <a:p>
             <a:fld id="{4509A250-FF31-4206-8172-F9D3106AACB1}" type="datetimeFigureOut">
               <a:rPr lang="en-US" dirty="0"/>
-              <a:t>2/27/2018</a:t>
+              <a:t>3/2/2018</a:t>
             </a:fld>
             <a:endParaRPr lang="en-US" dirty="0"/>
           </a:p>
@@ -3450,7 +3455,7 @@
           </a:lstStyle>
           <a:p>
             <a:r>
-              <a:rPr lang="en-US" smtClean="0"/>
+              <a:rPr lang="en-US"/>
               <a:t>Click to edit Master title style</a:t>
             </a:r>
             <a:endParaRPr lang="en-US" dirty="0"/>
@@ -3571,7 +3576,7 @@
           <a:p>
             <a:pPr lvl="0"/>
             <a:r>
-              <a:rPr lang="en-US" smtClean="0"/>
+              <a:rPr lang="en-US"/>
               <a:t>Click to edit Master text styles</a:t>
             </a:r>
           </a:p>
@@ -3594,7 +3599,7 @@
           <a:p>
             <a:fld id="{9796027F-7875-4030-9381-8BD8C4F21935}" type="datetimeFigureOut">
               <a:rPr lang="en-US" dirty="0"/>
-              <a:t>2/27/2018</a:t>
+              <a:t>3/2/2018</a:t>
             </a:fld>
             <a:endParaRPr lang="en-US" dirty="0"/>
           </a:p>
@@ -3683,7 +3688,7 @@
           <a:lstStyle/>
           <a:p>
             <a:r>
-              <a:rPr lang="en-US" smtClean="0"/>
+              <a:rPr lang="en-US"/>
               <a:t>Click to edit Master title style</a:t>
             </a:r>
             <a:endParaRPr lang="en-US" dirty="0"/>
@@ -3742,35 +3747,35 @@
           <a:p>
             <a:pPr lvl="0"/>
             <a:r>
-              <a:rPr lang="en-US" smtClean="0"/>
+              <a:rPr lang="en-US"/>
               <a:t>Click to edit Master text styles</a:t>
             </a:r>
           </a:p>
           <a:p>
             <a:pPr lvl="1"/>
             <a:r>
-              <a:rPr lang="en-US" smtClean="0"/>
+              <a:rPr lang="en-US"/>
               <a:t>Second level</a:t>
             </a:r>
           </a:p>
           <a:p>
             <a:pPr lvl="2"/>
             <a:r>
-              <a:rPr lang="en-US" smtClean="0"/>
+              <a:rPr lang="en-US"/>
               <a:t>Third level</a:t>
             </a:r>
           </a:p>
           <a:p>
             <a:pPr lvl="3"/>
             <a:r>
-              <a:rPr lang="en-US" smtClean="0"/>
+              <a:rPr lang="en-US"/>
               <a:t>Fourth level</a:t>
             </a:r>
           </a:p>
           <a:p>
             <a:pPr lvl="4"/>
             <a:r>
-              <a:rPr lang="en-US" smtClean="0"/>
+              <a:rPr lang="en-US"/>
               <a:t>Fifth level</a:t>
             </a:r>
             <a:endParaRPr lang="en-US" dirty="0"/>
@@ -3829,35 +3834,35 @@
           <a:p>
             <a:pPr lvl="0"/>
             <a:r>
-              <a:rPr lang="en-US" smtClean="0"/>
+              <a:rPr lang="en-US"/>
               <a:t>Click to edit Master text styles</a:t>
             </a:r>
           </a:p>
           <a:p>
             <a:pPr lvl="1"/>
             <a:r>
-              <a:rPr lang="en-US" smtClean="0"/>
+              <a:rPr lang="en-US"/>
               <a:t>Second level</a:t>
             </a:r>
           </a:p>
           <a:p>
             <a:pPr lvl="2"/>
             <a:r>
-              <a:rPr lang="en-US" smtClean="0"/>
+              <a:rPr lang="en-US"/>
               <a:t>Third level</a:t>
             </a:r>
           </a:p>
           <a:p>
             <a:pPr lvl="3"/>
             <a:r>
-              <a:rPr lang="en-US" smtClean="0"/>
+              <a:rPr lang="en-US"/>
               <a:t>Fourth level</a:t>
             </a:r>
           </a:p>
           <a:p>
             <a:pPr lvl="4"/>
             <a:r>
-              <a:rPr lang="en-US" smtClean="0"/>
+              <a:rPr lang="en-US"/>
               <a:t>Fifth level</a:t>
             </a:r>
             <a:endParaRPr lang="en-US" dirty="0"/>
@@ -3881,7 +3886,7 @@
           <a:p>
             <a:fld id="{9796027F-7875-4030-9381-8BD8C4F21935}" type="datetimeFigureOut">
               <a:rPr lang="en-US" dirty="0"/>
-              <a:t>2/27/2018</a:t>
+              <a:t>3/2/2018</a:t>
             </a:fld>
             <a:endParaRPr lang="en-US" dirty="0"/>
           </a:p>
@@ -3974,7 +3979,7 @@
           </a:lstStyle>
           <a:p>
             <a:r>
-              <a:rPr lang="en-US" smtClean="0"/>
+              <a:rPr lang="en-US"/>
               <a:t>Click to edit Master title style</a:t>
             </a:r>
             <a:endParaRPr lang="en-US" dirty="0"/>
@@ -4049,7 +4054,7 @@
           <a:p>
             <a:pPr lvl="0"/>
             <a:r>
-              <a:rPr lang="en-US" smtClean="0"/>
+              <a:rPr lang="en-US"/>
               <a:t>Click to edit Master text styles</a:t>
             </a:r>
           </a:p>
@@ -4107,35 +4112,35 @@
           <a:p>
             <a:pPr lvl="0"/>
             <a:r>
-              <a:rPr lang="en-US" smtClean="0"/>
+              <a:rPr lang="en-US"/>
               <a:t>Click to edit Master text styles</a:t>
             </a:r>
           </a:p>
           <a:p>
             <a:pPr lvl="1"/>
             <a:r>
-              <a:rPr lang="en-US" smtClean="0"/>
+              <a:rPr lang="en-US"/>
               <a:t>Second level</a:t>
             </a:r>
           </a:p>
           <a:p>
             <a:pPr lvl="2"/>
             <a:r>
-              <a:rPr lang="en-US" smtClean="0"/>
+              <a:rPr lang="en-US"/>
               <a:t>Third level</a:t>
             </a:r>
           </a:p>
           <a:p>
             <a:pPr lvl="3"/>
             <a:r>
-              <a:rPr lang="en-US" smtClean="0"/>
+              <a:rPr lang="en-US"/>
               <a:t>Fourth level</a:t>
             </a:r>
           </a:p>
           <a:p>
             <a:pPr lvl="4"/>
             <a:r>
-              <a:rPr lang="en-US" smtClean="0"/>
+              <a:rPr lang="en-US"/>
               <a:t>Fifth level</a:t>
             </a:r>
             <a:endParaRPr lang="en-US" dirty="0"/>
@@ -4210,7 +4215,7 @@
           <a:p>
             <a:pPr lvl="0"/>
             <a:r>
-              <a:rPr lang="en-US" smtClean="0"/>
+              <a:rPr lang="en-US"/>
               <a:t>Click to edit Master text styles</a:t>
             </a:r>
           </a:p>
@@ -4268,35 +4273,35 @@
           <a:p>
             <a:pPr lvl="0"/>
             <a:r>
-              <a:rPr lang="en-US" smtClean="0"/>
+              <a:rPr lang="en-US"/>
               <a:t>Click to edit Master text styles</a:t>
             </a:r>
           </a:p>
           <a:p>
             <a:pPr lvl="1"/>
             <a:r>
-              <a:rPr lang="en-US" smtClean="0"/>
+              <a:rPr lang="en-US"/>
               <a:t>Second level</a:t>
             </a:r>
           </a:p>
           <a:p>
             <a:pPr lvl="2"/>
             <a:r>
-              <a:rPr lang="en-US" smtClean="0"/>
+              <a:rPr lang="en-US"/>
               <a:t>Third level</a:t>
             </a:r>
           </a:p>
           <a:p>
             <a:pPr lvl="3"/>
             <a:r>
-              <a:rPr lang="en-US" smtClean="0"/>
+              <a:rPr lang="en-US"/>
               <a:t>Fourth level</a:t>
             </a:r>
           </a:p>
           <a:p>
             <a:pPr lvl="4"/>
             <a:r>
-              <a:rPr lang="en-US" smtClean="0"/>
+              <a:rPr lang="en-US"/>
               <a:t>Fifth level</a:t>
             </a:r>
             <a:endParaRPr lang="en-US" dirty="0"/>
@@ -4320,7 +4325,7 @@
           <a:p>
             <a:fld id="{9796027F-7875-4030-9381-8BD8C4F21935}" type="datetimeFigureOut">
               <a:rPr lang="en-US" dirty="0"/>
-              <a:t>2/27/2018</a:t>
+              <a:t>3/2/2018</a:t>
             </a:fld>
             <a:endParaRPr lang="en-US" dirty="0"/>
           </a:p>
@@ -4409,7 +4414,7 @@
           <a:lstStyle/>
           <a:p>
             <a:r>
-              <a:rPr lang="en-US" smtClean="0"/>
+              <a:rPr lang="en-US"/>
               <a:t>Click to edit Master title style</a:t>
             </a:r>
             <a:endParaRPr lang="en-US" dirty="0"/>
@@ -4433,7 +4438,7 @@
           <a:p>
             <a:fld id="{4509A250-FF31-4206-8172-F9D3106AACB1}" type="datetimeFigureOut">
               <a:rPr lang="en-US" dirty="0"/>
-              <a:t>2/27/2018</a:t>
+              <a:t>3/2/2018</a:t>
             </a:fld>
             <a:endParaRPr lang="en-US" dirty="0"/>
           </a:p>
@@ -4523,7 +4528,7 @@
           <a:p>
             <a:fld id="{4509A250-FF31-4206-8172-F9D3106AACB1}" type="datetimeFigureOut">
               <a:rPr lang="en-US" dirty="0"/>
-              <a:t>2/27/2018</a:t>
+              <a:t>3/2/2018</a:t>
             </a:fld>
             <a:endParaRPr lang="en-US" dirty="0"/>
           </a:p>
@@ -4621,7 +4626,7 @@
           </a:lstStyle>
           <a:p>
             <a:r>
-              <a:rPr lang="en-US" smtClean="0"/>
+              <a:rPr lang="en-US"/>
               <a:t>Click to edit Master title style</a:t>
             </a:r>
             <a:endParaRPr lang="en-US" dirty="0"/>
@@ -4680,35 +4685,35 @@
           <a:p>
             <a:pPr lvl="0"/>
             <a:r>
-              <a:rPr lang="en-US" smtClean="0"/>
+              <a:rPr lang="en-US"/>
               <a:t>Click to edit Master text styles</a:t>
             </a:r>
           </a:p>
           <a:p>
             <a:pPr lvl="1"/>
             <a:r>
-              <a:rPr lang="en-US" smtClean="0"/>
+              <a:rPr lang="en-US"/>
               <a:t>Second level</a:t>
             </a:r>
           </a:p>
           <a:p>
             <a:pPr lvl="2"/>
             <a:r>
-              <a:rPr lang="en-US" smtClean="0"/>
+              <a:rPr lang="en-US"/>
               <a:t>Third level</a:t>
             </a:r>
           </a:p>
           <a:p>
             <a:pPr lvl="3"/>
             <a:r>
-              <a:rPr lang="en-US" smtClean="0"/>
+              <a:rPr lang="en-US"/>
               <a:t>Fourth level</a:t>
             </a:r>
           </a:p>
           <a:p>
             <a:pPr lvl="4"/>
             <a:r>
-              <a:rPr lang="en-US" smtClean="0"/>
+              <a:rPr lang="en-US"/>
               <a:t>Fifth level</a:t>
             </a:r>
             <a:endParaRPr lang="en-US" dirty="0"/>
@@ -4774,7 +4779,7 @@
           <a:p>
             <a:pPr lvl="0"/>
             <a:r>
-              <a:rPr lang="en-US" smtClean="0"/>
+              <a:rPr lang="en-US"/>
               <a:t>Click to edit Master text styles</a:t>
             </a:r>
           </a:p>
@@ -4797,7 +4802,7 @@
           <a:p>
             <a:fld id="{4509A250-FF31-4206-8172-F9D3106AACB1}" type="datetimeFigureOut">
               <a:rPr lang="en-US" dirty="0"/>
-              <a:t>2/27/2018</a:t>
+              <a:t>3/2/2018</a:t>
             </a:fld>
             <a:endParaRPr lang="en-US" dirty="0"/>
           </a:p>
@@ -4897,7 +4902,7 @@
           </a:lstStyle>
           <a:p>
             <a:r>
-              <a:rPr lang="en-US" smtClean="0"/>
+              <a:rPr lang="en-US"/>
               <a:t>Click to edit Master title style</a:t>
             </a:r>
             <a:endParaRPr lang="en-US" dirty="0"/>
@@ -4976,7 +4981,7 @@
           </a:lstStyle>
           <a:p>
             <a:r>
-              <a:rPr lang="en-US" smtClean="0"/>
+              <a:rPr lang="en-US"/>
               <a:t>Click icon to add picture</a:t>
             </a:r>
             <a:endParaRPr lang="en-US" dirty="0"/>
@@ -5044,7 +5049,7 @@
           <a:p>
             <a:pPr lvl="0"/>
             <a:r>
-              <a:rPr lang="en-US" smtClean="0"/>
+              <a:rPr lang="en-US"/>
               <a:t>Click to edit Master text styles</a:t>
             </a:r>
           </a:p>
@@ -5067,7 +5072,7 @@
           <a:p>
             <a:fld id="{4509A250-FF31-4206-8172-F9D3106AACB1}" type="datetimeFigureOut">
               <a:rPr lang="en-US" dirty="0"/>
-              <a:t>2/27/2018</a:t>
+              <a:t>3/2/2018</a:t>
             </a:fld>
             <a:endParaRPr lang="en-US" dirty="0"/>
           </a:p>
@@ -5386,7 +5391,7 @@
           <a:lstStyle/>
           <a:p>
             <a:r>
-              <a:rPr lang="en-US" smtClean="0"/>
+              <a:rPr lang="en-US"/>
               <a:t>Click to edit Master title style</a:t>
             </a:r>
             <a:endParaRPr lang="en-US" dirty="0"/>
@@ -5420,35 +5425,35 @@
           <a:p>
             <a:pPr lvl="0"/>
             <a:r>
-              <a:rPr lang="en-US" smtClean="0"/>
+              <a:rPr lang="en-US"/>
               <a:t>Click to edit Master text styles</a:t>
             </a:r>
           </a:p>
           <a:p>
             <a:pPr lvl="1"/>
             <a:r>
-              <a:rPr lang="en-US" smtClean="0"/>
+              <a:rPr lang="en-US"/>
               <a:t>Second level</a:t>
             </a:r>
           </a:p>
           <a:p>
             <a:pPr lvl="2"/>
             <a:r>
-              <a:rPr lang="en-US" smtClean="0"/>
+              <a:rPr lang="en-US"/>
               <a:t>Third level</a:t>
             </a:r>
           </a:p>
           <a:p>
             <a:pPr lvl="3"/>
             <a:r>
-              <a:rPr lang="en-US" smtClean="0"/>
+              <a:rPr lang="en-US"/>
               <a:t>Fourth level</a:t>
             </a:r>
           </a:p>
           <a:p>
             <a:pPr lvl="4"/>
             <a:r>
-              <a:rPr lang="en-US" smtClean="0"/>
+              <a:rPr lang="en-US"/>
               <a:t>Fifth level</a:t>
             </a:r>
             <a:endParaRPr lang="en-US" dirty="0"/>
@@ -5491,7 +5496,7 @@
           <a:p>
             <a:fld id="{4AAD347D-5ACD-4C99-B74B-A9C85AD731AF}" type="datetimeFigureOut">
               <a:rPr lang="en-US" dirty="0"/>
-              <a:t>2/27/2018</a:t>
+              <a:t>3/2/2018</a:t>
             </a:fld>
             <a:endParaRPr lang="en-US" dirty="0"/>
           </a:p>
@@ -6031,11 +6036,11 @@
           <a:lstStyle/>
           <a:p>
             <a:r>
-              <a:rPr lang="en-GB" dirty="0" smtClean="0"/>
+              <a:rPr lang="en-GB" dirty="0"/>
               <a:t>Learning Python 3</a:t>
             </a:r>
             <a:br>
-              <a:rPr lang="en-GB" dirty="0" smtClean="0"/>
+              <a:rPr lang="en-GB" dirty="0"/>
             </a:br>
             <a:endParaRPr lang="en-GB" dirty="0"/>
           </a:p>
@@ -6057,18 +6062,17 @@
           <a:lstStyle/>
           <a:p>
             <a:r>
-              <a:rPr lang="en-GB" dirty="0" smtClean="0"/>
+              <a:rPr lang="en-GB" dirty="0"/>
               <a:t>Week 1: Getting setup and running your very first </a:t>
             </a:r>
             <a:r>
-              <a:rPr lang="en-GB" dirty="0" err="1" smtClean="0"/>
+              <a:rPr lang="en-GB" dirty="0" err="1"/>
               <a:t>programS</a:t>
             </a:r>
             <a:r>
-              <a:rPr lang="en-GB" dirty="0" smtClean="0"/>
+              <a:rPr lang="en-GB" dirty="0"/>
               <a:t>.</a:t>
             </a:r>
-            <a:endParaRPr lang="en-GB" dirty="0"/>
           </a:p>
         </p:txBody>
       </p:sp>
@@ -6118,10 +6122,9 @@
           <a:lstStyle/>
           <a:p>
             <a:r>
-              <a:rPr lang="en-GB" dirty="0" smtClean="0"/>
+              <a:rPr lang="en-GB" dirty="0"/>
               <a:t>Well done !</a:t>
             </a:r>
-            <a:endParaRPr lang="en-GB" dirty="0"/>
           </a:p>
         </p:txBody>
       </p:sp>
@@ -6141,7 +6144,7 @@
           <a:lstStyle/>
           <a:p>
             <a:r>
-              <a:rPr lang="en-GB" dirty="0" smtClean="0"/>
+              <a:rPr lang="en-GB" dirty="0"/>
               <a:t>You wrote and ran your first computer program, congratulations !</a:t>
             </a:r>
           </a:p>
@@ -6234,10 +6237,9 @@
           <a:lstStyle/>
           <a:p>
             <a:r>
-              <a:rPr lang="en-GB" dirty="0" smtClean="0"/>
+              <a:rPr lang="en-GB" dirty="0"/>
               <a:t>Making it easier (with better tools) !</a:t>
             </a:r>
-            <a:endParaRPr lang="en-GB" dirty="0"/>
           </a:p>
         </p:txBody>
       </p:sp>
@@ -6257,27 +6259,27 @@
           <a:lstStyle/>
           <a:p>
             <a:r>
-              <a:rPr lang="en-GB" dirty="0" smtClean="0"/>
+              <a:rPr lang="en-GB" dirty="0"/>
               <a:t>You can get tools to do all this in one program though.</a:t>
             </a:r>
           </a:p>
           <a:p>
             <a:r>
-              <a:rPr lang="en-GB" dirty="0" smtClean="0"/>
+              <a:rPr lang="en-GB" dirty="0"/>
               <a:t>I recommend a tool called “</a:t>
             </a:r>
             <a:r>
-              <a:rPr lang="en-GB" dirty="0" err="1" smtClean="0"/>
+              <a:rPr lang="en-GB" dirty="0" err="1"/>
               <a:t>PyCharm</a:t>
             </a:r>
             <a:r>
-              <a:rPr lang="en-GB" dirty="0" smtClean="0"/>
+              <a:rPr lang="en-GB" dirty="0"/>
               <a:t>”.</a:t>
             </a:r>
           </a:p>
           <a:p>
             <a:r>
-              <a:rPr lang="en-GB" dirty="0" smtClean="0"/>
+              <a:rPr lang="en-GB" dirty="0"/>
               <a:t>You can get it from </a:t>
             </a:r>
           </a:p>
@@ -6287,19 +6289,13 @@
               <a:rPr lang="en-GB" dirty="0">
                 <a:hlinkClick r:id="rId2"/>
               </a:rPr>
-              <a:t>https://</a:t>
-            </a:r>
-            <a:r>
-              <a:rPr lang="en-GB" dirty="0" smtClean="0">
-                <a:hlinkClick r:id="rId2"/>
-              </a:rPr>
-              <a:t>www.jetbrains.com/pycharm/download</a:t>
-            </a:r>
-            <a:endParaRPr lang="en-GB" dirty="0" smtClean="0"/>
-          </a:p>
-          <a:p>
-            <a:r>
-              <a:rPr lang="en-GB" dirty="0" smtClean="0"/>
+              <a:t>https://www.jetbrains.com/pycharm/download</a:t>
+            </a:r>
+            <a:endParaRPr lang="en-GB" dirty="0"/>
+          </a:p>
+          <a:p>
+            <a:r>
+              <a:rPr lang="en-GB" dirty="0"/>
               <a:t>You should pick the community edition.</a:t>
             </a:r>
           </a:p>
@@ -6308,7 +6304,7 @@
           </a:p>
           <a:p>
             <a:r>
-              <a:rPr lang="en-GB" b="1" u="sng" dirty="0" smtClean="0">
+              <a:rPr lang="en-GB" b="1" u="sng" dirty="0">
                 <a:solidFill>
                   <a:srgbClr val="FFFF00"/>
                 </a:solidFill>
@@ -6316,7 +6312,7 @@
               <a:t>ACTION</a:t>
             </a:r>
             <a:r>
-              <a:rPr lang="en-GB" u="sng" dirty="0" smtClean="0">
+              <a:rPr lang="en-GB" u="sng" dirty="0">
                 <a:solidFill>
                   <a:srgbClr val="FFFF00"/>
                 </a:solidFill>
@@ -6324,7 +6320,7 @@
               <a:t>:</a:t>
             </a:r>
             <a:r>
-              <a:rPr lang="en-GB" dirty="0" smtClean="0">
+              <a:rPr lang="en-GB" dirty="0">
                 <a:solidFill>
                   <a:srgbClr val="FFFF00"/>
                 </a:solidFill>
@@ -6332,7 +6328,7 @@
               <a:t> Install </a:t>
             </a:r>
             <a:r>
-              <a:rPr lang="en-GB" dirty="0" err="1" smtClean="0">
+              <a:rPr lang="en-GB" dirty="0" err="1">
                 <a:solidFill>
                   <a:srgbClr val="FFFF00"/>
                 </a:solidFill>
@@ -6340,18 +6336,13 @@
               <a:t>PyCharm</a:t>
             </a:r>
             <a:r>
-              <a:rPr lang="en-GB" dirty="0" smtClean="0">
+              <a:rPr lang="en-GB" dirty="0">
                 <a:solidFill>
                   <a:srgbClr val="FFFF00"/>
                 </a:solidFill>
               </a:rPr>
               <a:t> on your computer.</a:t>
             </a:r>
-            <a:endParaRPr lang="en-GB" dirty="0">
-              <a:solidFill>
-                <a:srgbClr val="FFFF00"/>
-              </a:solidFill>
-            </a:endParaRPr>
           </a:p>
         </p:txBody>
       </p:sp>
@@ -6401,18 +6392,17 @@
           <a:lstStyle/>
           <a:p>
             <a:r>
-              <a:rPr lang="en-GB" dirty="0" smtClean="0"/>
+              <a:rPr lang="en-GB" dirty="0"/>
               <a:t>FIXME: Do you need to do anything else to install and have </a:t>
             </a:r>
             <a:r>
-              <a:rPr lang="en-GB" dirty="0" err="1" smtClean="0"/>
+              <a:rPr lang="en-GB" dirty="0" err="1"/>
               <a:t>Pycharm</a:t>
             </a:r>
             <a:r>
-              <a:rPr lang="en-GB" dirty="0" smtClean="0"/>
+              <a:rPr lang="en-GB" dirty="0"/>
               <a:t> run on a fresh install ?</a:t>
             </a:r>
-            <a:endParaRPr lang="en-GB" dirty="0"/>
           </a:p>
         </p:txBody>
       </p:sp>
@@ -6462,11 +6452,11 @@
           <a:lstStyle/>
           <a:p>
             <a:r>
-              <a:rPr lang="en-GB" dirty="0" smtClean="0"/>
+              <a:rPr lang="en-GB" dirty="0"/>
               <a:t>What is </a:t>
             </a:r>
             <a:r>
-              <a:rPr lang="en-GB" dirty="0" err="1" smtClean="0"/>
+              <a:rPr lang="en-GB" dirty="0" err="1"/>
               <a:t>PyCharm</a:t>
             </a:r>
             <a:endParaRPr lang="en-GB" dirty="0"/>
@@ -6489,32 +6479,31 @@
           <a:lstStyle/>
           <a:p>
             <a:r>
-              <a:rPr lang="en-GB" dirty="0" err="1" smtClean="0"/>
+              <a:rPr lang="en-GB" dirty="0" err="1"/>
               <a:t>PyCharm</a:t>
             </a:r>
             <a:r>
-              <a:rPr lang="en-GB" dirty="0" smtClean="0"/>
+              <a:rPr lang="en-GB" dirty="0"/>
               <a:t> is an example of an IDE (Integrated Development Environment).</a:t>
             </a:r>
           </a:p>
           <a:p>
             <a:r>
-              <a:rPr lang="en-GB" dirty="0" smtClean="0"/>
+              <a:rPr lang="en-GB" dirty="0"/>
               <a:t>It puts all the tools you need to create, run and debug programs in once place.</a:t>
             </a:r>
           </a:p>
           <a:p>
             <a:r>
-              <a:rPr lang="en-GB" dirty="0" smtClean="0"/>
+              <a:rPr lang="en-GB" dirty="0"/>
               <a:t>It helps you to write code with a large variety of features.</a:t>
             </a:r>
           </a:p>
           <a:p>
             <a:r>
-              <a:rPr lang="en-GB" dirty="0" smtClean="0"/>
+              <a:rPr lang="en-GB" dirty="0"/>
               <a:t>As we continue this course, you will learn about several of these features.</a:t>
             </a:r>
-            <a:endParaRPr lang="en-GB" dirty="0"/>
           </a:p>
         </p:txBody>
       </p:sp>
@@ -6564,10 +6553,9 @@
           <a:lstStyle/>
           <a:p>
             <a:r>
-              <a:rPr lang="en-GB" dirty="0" smtClean="0"/>
+              <a:rPr lang="en-GB" dirty="0"/>
               <a:t>Making a Hello World Project.</a:t>
             </a:r>
-            <a:endParaRPr lang="en-GB" dirty="0"/>
           </a:p>
         </p:txBody>
       </p:sp>
@@ -6595,7 +6583,7 @@
               <a:buNone/>
             </a:pPr>
             <a:r>
-              <a:rPr lang="en-GB" b="1" u="sng" dirty="0" smtClean="0">
+              <a:rPr lang="en-GB" b="1" u="sng" dirty="0">
                 <a:solidFill>
                   <a:srgbClr val="FFFF00"/>
                 </a:solidFill>
@@ -6605,7 +6593,7 @@
           </a:p>
           <a:p>
             <a:r>
-              <a:rPr lang="en-GB" dirty="0" smtClean="0">
+              <a:rPr lang="en-GB" dirty="0">
                 <a:solidFill>
                   <a:srgbClr val="FFFF00"/>
                 </a:solidFill>
@@ -6613,7 +6601,7 @@
               <a:t>Load </a:t>
             </a:r>
             <a:r>
-              <a:rPr lang="en-GB" dirty="0" err="1" smtClean="0">
+              <a:rPr lang="en-GB" dirty="0" err="1">
                 <a:solidFill>
                   <a:srgbClr val="FFFF00"/>
                 </a:solidFill>
@@ -6621,7 +6609,7 @@
               <a:t>PyCharm</a:t>
             </a:r>
             <a:r>
-              <a:rPr lang="en-GB" dirty="0" smtClean="0">
+              <a:rPr lang="en-GB" dirty="0">
                 <a:solidFill>
                   <a:srgbClr val="FFFF00"/>
                 </a:solidFill>
@@ -6631,7 +6619,7 @@
           </a:p>
           <a:p>
             <a:r>
-              <a:rPr lang="en-GB" dirty="0" smtClean="0">
+              <a:rPr lang="en-GB" dirty="0">
                 <a:solidFill>
                   <a:srgbClr val="FFFF00"/>
                 </a:solidFill>
@@ -6641,7 +6629,7 @@
           </a:p>
           <a:p>
             <a:r>
-              <a:rPr lang="en-GB" dirty="0" smtClean="0">
+              <a:rPr lang="en-GB" dirty="0">
                 <a:solidFill>
                   <a:srgbClr val="FFFF00"/>
                 </a:solidFill>
@@ -6649,7 +6637,7 @@
               <a:t>Call the project “</a:t>
             </a:r>
             <a:r>
-              <a:rPr lang="en-GB" dirty="0" err="1" smtClean="0">
+              <a:rPr lang="en-GB" dirty="0" err="1">
                 <a:solidFill>
                   <a:srgbClr val="FFFF00"/>
                 </a:solidFill>
@@ -6657,7 +6645,7 @@
               <a:t>Hello_World</a:t>
             </a:r>
             <a:r>
-              <a:rPr lang="en-GB" dirty="0" smtClean="0">
+              <a:rPr lang="en-GB" dirty="0">
                 <a:solidFill>
                   <a:srgbClr val="FFFF00"/>
                 </a:solidFill>
@@ -6677,7 +6665,7 @@
               <a:buNone/>
             </a:pPr>
             <a:r>
-              <a:rPr lang="en-GB" b="1" u="sng" dirty="0" smtClean="0">
+              <a:rPr lang="en-GB" b="1" u="sng" dirty="0">
                 <a:solidFill>
                   <a:srgbClr val="FFFF00"/>
                 </a:solidFill>
@@ -6687,7 +6675,7 @@
           </a:p>
           <a:p>
             <a:r>
-              <a:rPr lang="en-GB" dirty="0" smtClean="0">
+              <a:rPr lang="en-GB" dirty="0">
                 <a:solidFill>
                   <a:srgbClr val="FFFF00"/>
                 </a:solidFill>
@@ -6773,10 +6761,9 @@
           <a:lstStyle/>
           <a:p>
             <a:r>
-              <a:rPr lang="en-GB" dirty="0" smtClean="0"/>
+              <a:rPr lang="en-GB" dirty="0"/>
               <a:t>Creating the Hello World File.</a:t>
             </a:r>
-            <a:endParaRPr lang="en-GB" dirty="0"/>
           </a:p>
         </p:txBody>
       </p:sp>
@@ -6801,22 +6788,22 @@
           <a:lstStyle/>
           <a:p>
             <a:r>
-              <a:rPr lang="en-GB" dirty="0" smtClean="0"/>
+              <a:rPr lang="en-GB" dirty="0"/>
               <a:t>This will have created a folder on your PC for your new Hello World project.</a:t>
             </a:r>
           </a:p>
           <a:p>
             <a:r>
-              <a:rPr lang="en-GB" dirty="0" smtClean="0"/>
+              <a:rPr lang="en-GB" dirty="0"/>
               <a:t>To create a file in it, you should right click the main folder on the right, and create a Python file.</a:t>
             </a:r>
           </a:p>
           <a:p>
-            <a:endParaRPr lang="en-GB" dirty="0" smtClean="0"/>
-          </a:p>
-          <a:p>
-            <a:r>
-              <a:rPr lang="en-GB" b="1" u="sng" dirty="0" smtClean="0">
+            <a:endParaRPr lang="en-GB" dirty="0"/>
+          </a:p>
+          <a:p>
+            <a:r>
+              <a:rPr lang="en-GB" b="1" u="sng" dirty="0">
                 <a:solidFill>
                   <a:srgbClr val="FFFF00"/>
                 </a:solidFill>
@@ -6824,7 +6811,7 @@
               <a:t>Action</a:t>
             </a:r>
             <a:r>
-              <a:rPr lang="en-GB" dirty="0" smtClean="0">
+              <a:rPr lang="en-GB" dirty="0">
                 <a:solidFill>
                   <a:srgbClr val="FFFF00"/>
                 </a:solidFill>
@@ -6832,7 +6819,7 @@
               <a:t>: Create a file called “</a:t>
             </a:r>
             <a:r>
-              <a:rPr lang="en-GB" dirty="0" err="1" smtClean="0">
+              <a:rPr lang="en-GB" dirty="0" err="1">
                 <a:solidFill>
                   <a:srgbClr val="FFFF00"/>
                 </a:solidFill>
@@ -6840,18 +6827,13 @@
               <a:t>Hello_World</a:t>
             </a:r>
             <a:r>
-              <a:rPr lang="en-GB" dirty="0" smtClean="0">
+              <a:rPr lang="en-GB" dirty="0">
                 <a:solidFill>
                   <a:srgbClr val="FFFF00"/>
                 </a:solidFill>
               </a:rPr>
               <a:t>”</a:t>
             </a:r>
-            <a:endParaRPr lang="en-GB" dirty="0">
-              <a:solidFill>
-                <a:srgbClr val="FFFF00"/>
-              </a:solidFill>
-            </a:endParaRPr>
           </a:p>
         </p:txBody>
       </p:sp>
@@ -6925,18 +6907,17 @@
           <a:lstStyle/>
           <a:p>
             <a:r>
-              <a:rPr lang="en-GB" dirty="0" smtClean="0"/>
+              <a:rPr lang="en-GB" dirty="0"/>
               <a:t>Writing Hello World in </a:t>
             </a:r>
             <a:r>
-              <a:rPr lang="en-GB" dirty="0" err="1" smtClean="0"/>
+              <a:rPr lang="en-GB" dirty="0" err="1"/>
               <a:t>PyCharm</a:t>
             </a:r>
             <a:r>
-              <a:rPr lang="en-GB" dirty="0" smtClean="0"/>
+              <a:rPr lang="en-GB" dirty="0"/>
               <a:t>.</a:t>
             </a:r>
-            <a:endParaRPr lang="en-GB" dirty="0"/>
           </a:p>
         </p:txBody>
       </p:sp>
@@ -6961,7 +6942,7 @@
           <a:lstStyle/>
           <a:p>
             <a:r>
-              <a:rPr lang="en-GB" b="1" u="sng" dirty="0" smtClean="0">
+              <a:rPr lang="en-GB" b="1" u="sng" dirty="0">
                 <a:solidFill>
                   <a:srgbClr val="FFFF00"/>
                 </a:solidFill>
@@ -6969,7 +6950,7 @@
               <a:t>ACTION:</a:t>
             </a:r>
             <a:r>
-              <a:rPr lang="en-GB" dirty="0" smtClean="0">
+              <a:rPr lang="en-GB" dirty="0">
                 <a:solidFill>
                   <a:srgbClr val="FFFF00"/>
                 </a:solidFill>
@@ -7049,10 +7030,9 @@
           <a:lstStyle/>
           <a:p>
             <a:r>
-              <a:rPr lang="en-GB" dirty="0" smtClean="0"/>
+              <a:rPr lang="en-GB" dirty="0"/>
               <a:t>Run the Program.</a:t>
             </a:r>
-            <a:endParaRPr lang="en-GB" dirty="0"/>
           </a:p>
         </p:txBody>
       </p:sp>
@@ -7079,7 +7059,7 @@
           <a:lstStyle/>
           <a:p>
             <a:r>
-              <a:rPr lang="en-GB" b="1" u="sng" dirty="0" smtClean="0">
+              <a:rPr lang="en-GB" b="1" u="sng" dirty="0">
                 <a:solidFill>
                   <a:srgbClr val="FFFF00"/>
                 </a:solidFill>
@@ -7087,7 +7067,7 @@
               <a:t>ACTION: </a:t>
             </a:r>
             <a:r>
-              <a:rPr lang="en-GB" dirty="0" smtClean="0">
+              <a:rPr lang="en-GB" dirty="0">
                 <a:solidFill>
                   <a:srgbClr val="FFFF00"/>
                 </a:solidFill>
@@ -7095,7 +7075,7 @@
               <a:t>Use </a:t>
             </a:r>
             <a:r>
-              <a:rPr lang="en-GB" dirty="0" err="1" smtClean="0">
+              <a:rPr lang="en-GB" dirty="0" err="1">
                 <a:solidFill>
                   <a:srgbClr val="FFFF00"/>
                 </a:solidFill>
@@ -7103,7 +7083,7 @@
               <a:t>PyCharm</a:t>
             </a:r>
             <a:r>
-              <a:rPr lang="en-GB" dirty="0" smtClean="0">
+              <a:rPr lang="en-GB" dirty="0">
                 <a:solidFill>
                   <a:srgbClr val="FFFF00"/>
                 </a:solidFill>
@@ -7113,7 +7093,7 @@
           </a:p>
           <a:p>
             <a:r>
-              <a:rPr lang="en-GB" b="1" u="sng" dirty="0" smtClean="0">
+              <a:rPr lang="en-GB" b="1" u="sng" dirty="0">
                 <a:solidFill>
                   <a:srgbClr val="FFFF00"/>
                 </a:solidFill>
@@ -7121,7 +7101,7 @@
               <a:t>CHECK:</a:t>
             </a:r>
             <a:r>
-              <a:rPr lang="en-GB" dirty="0" smtClean="0">
+              <a:rPr lang="en-GB" dirty="0">
                 <a:solidFill>
                   <a:srgbClr val="FFFF00"/>
                 </a:solidFill>
@@ -7131,7 +7111,7 @@
           </a:p>
           <a:p>
             <a:r>
-              <a:rPr lang="en-GB" b="1" u="sng" dirty="0" smtClean="0">
+              <a:rPr lang="en-GB" b="1" u="sng" dirty="0">
                 <a:solidFill>
                   <a:srgbClr val="FFFF00"/>
                 </a:solidFill>
@@ -7139,7 +7119,7 @@
               <a:t>SHORTCUT:</a:t>
             </a:r>
             <a:r>
-              <a:rPr lang="en-GB" dirty="0" smtClean="0">
+              <a:rPr lang="en-GB" dirty="0">
                 <a:solidFill>
                   <a:srgbClr val="FFFF00"/>
                 </a:solidFill>
@@ -7257,11 +7237,11 @@
           <a:lstStyle/>
           <a:p>
             <a:r>
-              <a:rPr lang="en-GB" dirty="0" smtClean="0"/>
+              <a:rPr lang="en-GB" dirty="0"/>
               <a:t>Homework </a:t>
             </a:r>
             <a:r>
-              <a:rPr lang="en-GB" dirty="0" smtClean="0">
+              <a:rPr lang="en-GB" dirty="0">
                 <a:sym typeface="Wingdings" panose="05000000000000000000" pitchFamily="2" charset="2"/>
               </a:rPr>
               <a:t></a:t>
@@ -7291,7 +7271,7 @@
           <a:lstStyle/>
           <a:p>
             <a:r>
-              <a:rPr lang="en-GB" dirty="0" smtClean="0"/>
+              <a:rPr lang="en-GB" dirty="0"/>
               <a:t>This weeks homework is quite easy.</a:t>
             </a:r>
           </a:p>
@@ -7300,27 +7280,27 @@
           </a:p>
           <a:p>
             <a:r>
-              <a:rPr lang="en-GB" dirty="0" smtClean="0"/>
+              <a:rPr lang="en-GB" dirty="0"/>
               <a:t>Project1: “Hello Universe”.</a:t>
             </a:r>
           </a:p>
           <a:p>
             <a:pPr lvl="1"/>
             <a:r>
-              <a:rPr lang="en-GB" dirty="0" smtClean="0"/>
+              <a:rPr lang="en-GB" dirty="0"/>
               <a:t>Write a program like the one that said hello to the world, but instead says hello to the entire universe instead.</a:t>
             </a:r>
           </a:p>
           <a:p>
             <a:r>
-              <a:rPr lang="en-GB" dirty="0" smtClean="0"/>
+              <a:rPr lang="en-GB" dirty="0"/>
               <a:t>Project2: “1 to 10”.</a:t>
             </a:r>
           </a:p>
           <a:p>
             <a:pPr lvl="1"/>
             <a:r>
-              <a:rPr lang="en-GB" dirty="0" smtClean="0"/>
+              <a:rPr lang="en-GB" dirty="0"/>
               <a:t>Write a program, which prints the numbers 1 to 10, each on a separate line.</a:t>
             </a:r>
           </a:p>
@@ -7579,14 +7559,14 @@
               <a:buNone/>
             </a:pPr>
             <a:r>
-              <a:rPr lang="en-GB" b="1" dirty="0" smtClean="0"/>
+              <a:rPr lang="en-GB" b="1" dirty="0"/>
               <a:t>Expected Output</a:t>
             </a:r>
             <a:br>
-              <a:rPr lang="en-GB" b="1" dirty="0" smtClean="0"/>
+              <a:rPr lang="en-GB" b="1" dirty="0"/>
             </a:br>
             <a:r>
-              <a:rPr lang="en-GB" b="1" dirty="0" smtClean="0"/>
+              <a:rPr lang="en-GB" b="1" dirty="0"/>
               <a:t>Project 1</a:t>
             </a:r>
           </a:p>
@@ -7594,26 +7574,15 @@
             <a:pPr marL="0" indent="0">
               <a:buNone/>
             </a:pPr>
-            <a:r>
-              <a:rPr lang="en-GB" dirty="0" smtClean="0"/>
-              <a:t/>
-            </a:r>
             <a:br>
-              <a:rPr lang="en-GB" dirty="0" smtClean="0"/>
+              <a:rPr lang="en-GB" dirty="0"/>
             </a:br>
             <a:r>
               <a:rPr lang="en-GB" dirty="0">
                 <a:latin typeface="Courier New" panose="02070309020205020404" pitchFamily="49" charset="0"/>
                 <a:cs typeface="Courier New" panose="02070309020205020404" pitchFamily="49" charset="0"/>
               </a:rPr>
-              <a:t>Hello Universe </a:t>
-            </a:r>
-            <a:r>
-              <a:rPr lang="en-GB" dirty="0" smtClean="0">
-                <a:latin typeface="Courier New" panose="02070309020205020404" pitchFamily="49" charset="0"/>
-                <a:cs typeface="Courier New" panose="02070309020205020404" pitchFamily="49" charset="0"/>
-              </a:rPr>
-              <a:t>!</a:t>
+              <a:t>Hello Universe !</a:t>
             </a:r>
           </a:p>
           <a:p>
@@ -7631,11 +7600,7 @@
             </a:pPr>
             <a:r>
               <a:rPr lang="en-GB" b="1" dirty="0"/>
-              <a:t>Project </a:t>
-            </a:r>
-            <a:r>
-              <a:rPr lang="en-GB" b="1" dirty="0" smtClean="0"/>
-              <a:t>2</a:t>
+              <a:t>Project 2</a:t>
             </a:r>
           </a:p>
           <a:p>
@@ -7643,7 +7608,7 @@
               <a:buNone/>
             </a:pPr>
             <a:r>
-              <a:rPr lang="en-GB" dirty="0" smtClean="0">
+              <a:rPr lang="en-GB" dirty="0">
                 <a:latin typeface="Courier New" panose="02070309020205020404" pitchFamily="49" charset="0"/>
                 <a:cs typeface="Courier New" panose="02070309020205020404" pitchFamily="49" charset="0"/>
               </a:rPr>
@@ -7655,7 +7620,7 @@
               <a:buNone/>
             </a:pPr>
             <a:r>
-              <a:rPr lang="en-GB" dirty="0" smtClean="0">
+              <a:rPr lang="en-GB" dirty="0">
                 <a:latin typeface="Courier New" panose="02070309020205020404" pitchFamily="49" charset="0"/>
                 <a:cs typeface="Courier New" panose="02070309020205020404" pitchFamily="49" charset="0"/>
               </a:rPr>
@@ -7667,7 +7632,7 @@
               <a:buNone/>
             </a:pPr>
             <a:r>
-              <a:rPr lang="en-GB" dirty="0" smtClean="0">
+              <a:rPr lang="en-GB" dirty="0">
                 <a:latin typeface="Courier New" panose="02070309020205020404" pitchFamily="49" charset="0"/>
                 <a:cs typeface="Courier New" panose="02070309020205020404" pitchFamily="49" charset="0"/>
               </a:rPr>
@@ -7679,7 +7644,7 @@
               <a:buNone/>
             </a:pPr>
             <a:r>
-              <a:rPr lang="en-GB" dirty="0" smtClean="0">
+              <a:rPr lang="en-GB" dirty="0">
                 <a:latin typeface="Courier New" panose="02070309020205020404" pitchFamily="49" charset="0"/>
                 <a:cs typeface="Courier New" panose="02070309020205020404" pitchFamily="49" charset="0"/>
               </a:rPr>
@@ -7691,7 +7656,7 @@
               <a:buNone/>
             </a:pPr>
             <a:r>
-              <a:rPr lang="en-GB" dirty="0" smtClean="0">
+              <a:rPr lang="en-GB" dirty="0">
                 <a:latin typeface="Courier New" panose="02070309020205020404" pitchFamily="49" charset="0"/>
                 <a:cs typeface="Courier New" panose="02070309020205020404" pitchFamily="49" charset="0"/>
               </a:rPr>
@@ -7703,7 +7668,7 @@
               <a:buNone/>
             </a:pPr>
             <a:r>
-              <a:rPr lang="en-GB" dirty="0" smtClean="0">
+              <a:rPr lang="en-GB" dirty="0">
                 <a:latin typeface="Courier New" panose="02070309020205020404" pitchFamily="49" charset="0"/>
                 <a:cs typeface="Courier New" panose="02070309020205020404" pitchFamily="49" charset="0"/>
               </a:rPr>
@@ -7715,7 +7680,7 @@
               <a:buNone/>
             </a:pPr>
             <a:r>
-              <a:rPr lang="en-GB" dirty="0" smtClean="0">
+              <a:rPr lang="en-GB" dirty="0">
                 <a:latin typeface="Courier New" panose="02070309020205020404" pitchFamily="49" charset="0"/>
                 <a:cs typeface="Courier New" panose="02070309020205020404" pitchFamily="49" charset="0"/>
               </a:rPr>
@@ -7727,7 +7692,7 @@
               <a:buNone/>
             </a:pPr>
             <a:r>
-              <a:rPr lang="en-GB" dirty="0" smtClean="0">
+              <a:rPr lang="en-GB" dirty="0">
                 <a:latin typeface="Courier New" panose="02070309020205020404" pitchFamily="49" charset="0"/>
                 <a:cs typeface="Courier New" panose="02070309020205020404" pitchFamily="49" charset="0"/>
               </a:rPr>
@@ -7739,7 +7704,7 @@
               <a:buNone/>
             </a:pPr>
             <a:r>
-              <a:rPr lang="en-GB" dirty="0" smtClean="0">
+              <a:rPr lang="en-GB" dirty="0">
                 <a:latin typeface="Courier New" panose="02070309020205020404" pitchFamily="49" charset="0"/>
                 <a:cs typeface="Courier New" panose="02070309020205020404" pitchFamily="49" charset="0"/>
               </a:rPr>
@@ -7751,16 +7716,12 @@
               <a:buNone/>
             </a:pPr>
             <a:r>
-              <a:rPr lang="en-GB" dirty="0" smtClean="0">
+              <a:rPr lang="en-GB" dirty="0">
                 <a:latin typeface="Courier New" panose="02070309020205020404" pitchFamily="49" charset="0"/>
                 <a:cs typeface="Courier New" panose="02070309020205020404" pitchFamily="49" charset="0"/>
               </a:rPr>
               <a:t>10</a:t>
             </a:r>
-            <a:endParaRPr lang="en-GB" dirty="0" smtClean="0">
-              <a:latin typeface="Courier New" panose="02070309020205020404" pitchFamily="49" charset="0"/>
-              <a:cs typeface="Courier New" panose="02070309020205020404" pitchFamily="49" charset="0"/>
-            </a:endParaRPr>
           </a:p>
         </p:txBody>
       </p:sp>
@@ -7810,10 +7771,9 @@
           <a:lstStyle/>
           <a:p>
             <a:r>
-              <a:rPr lang="en-GB" dirty="0" smtClean="0"/>
+              <a:rPr lang="en-GB" dirty="0"/>
               <a:t>What we will learn next week !</a:t>
             </a:r>
-            <a:endParaRPr lang="en-GB" dirty="0"/>
           </a:p>
         </p:txBody>
       </p:sp>
@@ -7833,25 +7793,25 @@
           <a:lstStyle/>
           <a:p>
             <a:r>
-              <a:rPr lang="en-GB" dirty="0" smtClean="0"/>
+              <a:rPr lang="en-GB" dirty="0"/>
               <a:t>We will learn how to ask the person running the program questions, and use the answers they give in running the program.</a:t>
             </a:r>
           </a:p>
           <a:p>
-            <a:endParaRPr lang="en-GB" dirty="0" smtClean="0"/>
-          </a:p>
-          <a:p>
-            <a:r>
-              <a:rPr lang="en-GB" dirty="0" smtClean="0"/>
+            <a:endParaRPr lang="en-GB" dirty="0"/>
+          </a:p>
+          <a:p>
+            <a:r>
+              <a:rPr lang="en-GB" dirty="0"/>
               <a:t>We will learn a much better way to write the 1 to 10 program.</a:t>
             </a:r>
           </a:p>
           <a:p>
-            <a:endParaRPr lang="en-GB" dirty="0" smtClean="0"/>
-          </a:p>
-          <a:p>
-            <a:r>
-              <a:rPr lang="en-GB" dirty="0" smtClean="0"/>
+            <a:endParaRPr lang="en-GB" dirty="0"/>
+          </a:p>
+          <a:p>
+            <a:r>
+              <a:rPr lang="en-GB" dirty="0"/>
               <a:t>We will learn how to easily make it count to a million !</a:t>
             </a:r>
           </a:p>
@@ -7903,10 +7863,9 @@
           <a:lstStyle/>
           <a:p>
             <a:r>
-              <a:rPr lang="en-GB" dirty="0" smtClean="0"/>
+              <a:rPr lang="en-GB" dirty="0"/>
               <a:t>What is Python ?</a:t>
             </a:r>
-            <a:endParaRPr lang="en-GB" dirty="0"/>
           </a:p>
         </p:txBody>
       </p:sp>
@@ -7926,97 +7885,70 @@
           <a:lstStyle/>
           <a:p>
             <a:r>
-              <a:rPr lang="en-GB" dirty="0" smtClean="0"/>
-              <a:t>Python is a programming language. Other famous programming languages include “Java”,</a:t>
-            </a:r>
-            <a:r>
               <a:rPr lang="en-GB" dirty="0"/>
-              <a:t> </a:t>
-            </a:r>
-            <a:r>
-              <a:rPr lang="en-GB" dirty="0" smtClean="0"/>
-              <a:t>“</a:t>
-            </a:r>
-            <a:r>
-              <a:rPr lang="en-GB" dirty="0" err="1" smtClean="0"/>
+              <a:t>Python is a programming language. Other famous programming languages include “Java”, “</a:t>
+            </a:r>
+            <a:r>
+              <a:rPr lang="en-GB" dirty="0" err="1"/>
               <a:t>Javascript</a:t>
             </a:r>
             <a:r>
-              <a:rPr lang="en-GB" dirty="0" smtClean="0"/>
+              <a:rPr lang="en-GB" dirty="0"/>
               <a:t>”, “C”, “Ruby” and “PHP”.</a:t>
             </a:r>
           </a:p>
           <a:p>
             <a:r>
-              <a:rPr lang="en-GB" dirty="0" smtClean="0"/>
+              <a:rPr lang="en-GB" dirty="0"/>
               <a:t>Python is a major programming language which has been used to build sites and services such as :-</a:t>
             </a:r>
           </a:p>
           <a:p>
             <a:pPr lvl="1"/>
             <a:r>
-              <a:rPr lang="en-GB" dirty="0" smtClean="0"/>
-              <a:t>Dropbox (who employ the engineer who first made Python).</a:t>
+              <a:rPr lang="en-GB" dirty="0"/>
+              <a:t>Dropbox (who employ the engineer who first made Python)</a:t>
             </a:r>
           </a:p>
           <a:p>
             <a:pPr lvl="1"/>
             <a:r>
-              <a:rPr lang="en-GB" dirty="0" err="1" smtClean="0"/>
+              <a:rPr lang="en-GB" dirty="0" err="1"/>
               <a:t>Youtube</a:t>
             </a:r>
             <a:r>
-              <a:rPr lang="en-GB" dirty="0" smtClean="0"/>
+              <a:rPr lang="en-GB" dirty="0"/>
               <a:t> (who use Python to build the </a:t>
             </a:r>
             <a:r>
-              <a:rPr lang="en-GB" dirty="0" err="1" smtClean="0"/>
+              <a:rPr lang="en-GB" dirty="0" err="1"/>
               <a:t>Youtube</a:t>
             </a:r>
             <a:r>
-              <a:rPr lang="en-GB" dirty="0" smtClean="0"/>
-              <a:t> webpages).</a:t>
+              <a:rPr lang="en-GB" dirty="0"/>
+              <a:t> webpages)</a:t>
             </a:r>
           </a:p>
           <a:p>
             <a:pPr lvl="1"/>
             <a:r>
-              <a:rPr lang="en-GB" dirty="0" err="1" smtClean="0"/>
-              <a:t>Instragram</a:t>
-            </a:r>
-            <a:endParaRPr lang="en-GB" dirty="0" smtClean="0"/>
+              <a:rPr lang="en-GB" dirty="0"/>
+              <a:t>Instagram</a:t>
+            </a:r>
           </a:p>
           <a:p>
             <a:pPr lvl="1"/>
             <a:r>
-              <a:rPr lang="en-GB" dirty="0" smtClean="0"/>
-              <a:t>The Large </a:t>
-            </a:r>
-            <a:r>
-              <a:rPr lang="en-GB" dirty="0" err="1" smtClean="0"/>
-              <a:t>Hardron</a:t>
-            </a:r>
-            <a:r>
-              <a:rPr lang="en-GB" dirty="0" smtClean="0"/>
-              <a:t> </a:t>
-            </a:r>
-            <a:r>
-              <a:rPr lang="en-GB" dirty="0" err="1" smtClean="0"/>
-              <a:t>Colider</a:t>
-            </a:r>
-            <a:endParaRPr lang="en-GB" dirty="0" smtClean="0"/>
+              <a:rPr lang="en-GB" dirty="0"/>
+              <a:t>The Large Hadron Collider</a:t>
+            </a:r>
           </a:p>
           <a:p>
             <a:pPr lvl="1"/>
             <a:r>
-              <a:rPr lang="en-GB" dirty="0" err="1" smtClean="0"/>
-              <a:t>Lucasfilm</a:t>
-            </a:r>
-            <a:r>
-              <a:rPr lang="en-GB" dirty="0" smtClean="0"/>
-              <a:t> (who used Python to control the special effects on the recent Star Wars movies).</a:t>
-            </a:r>
-            <a:endParaRPr lang="en-GB" dirty="0"/>
+              <a:rPr lang="en-GB" dirty="0"/>
+              <a:t>Lucasfilm (who used Python to control the special effects on the recent Star Wars movies)</a:t>
+            </a:r>
           </a:p>
         </p:txBody>
       </p:sp>
@@ -8066,10 +7998,9 @@
           <a:lstStyle/>
           <a:p>
             <a:r>
-              <a:rPr lang="en-GB" dirty="0" smtClean="0"/>
+              <a:rPr lang="en-GB" dirty="0"/>
               <a:t>What version of Python ?</a:t>
             </a:r>
-            <a:endParaRPr lang="en-GB" dirty="0"/>
           </a:p>
         </p:txBody>
       </p:sp>
@@ -8089,30 +8020,30 @@
           <a:lstStyle/>
           <a:p>
             <a:r>
-              <a:rPr lang="en-GB" dirty="0" smtClean="0"/>
+              <a:rPr lang="en-GB" dirty="0"/>
               <a:t>There are two main versions of Python in use today, which are very similar but not 100% compatible.</a:t>
             </a:r>
           </a:p>
           <a:p>
             <a:pPr lvl="1"/>
             <a:r>
-              <a:rPr lang="en-GB" b="1" dirty="0" smtClean="0"/>
+              <a:rPr lang="en-GB" b="1" dirty="0"/>
               <a:t>Python 2:</a:t>
             </a:r>
             <a:r>
-              <a:rPr lang="en-GB" dirty="0" smtClean="0"/>
+              <a:rPr lang="en-GB" dirty="0"/>
               <a:t> Was originally released in 2000. The last version of Python 2 will be released in 2020 and then the language will get no further support.</a:t>
             </a:r>
-            <a:endParaRPr lang="en-GB" b="1" dirty="0" smtClean="0"/>
+            <a:endParaRPr lang="en-GB" b="1" dirty="0"/>
           </a:p>
           <a:p>
             <a:pPr lvl="1"/>
             <a:r>
-              <a:rPr lang="en-GB" b="1" dirty="0" smtClean="0"/>
+              <a:rPr lang="en-GB" b="1" dirty="0"/>
               <a:t>Python 3: </a:t>
             </a:r>
             <a:r>
-              <a:rPr lang="en-GB" dirty="0" smtClean="0"/>
+              <a:rPr lang="en-GB" dirty="0"/>
               <a:t>The first version was released in 2008, and support will continue.</a:t>
             </a:r>
           </a:p>
@@ -8122,7 +8053,7 @@
           </a:p>
           <a:p>
             <a:r>
-              <a:rPr lang="en-GB" dirty="0" smtClean="0"/>
+              <a:rPr lang="en-GB" dirty="0"/>
               <a:t>We will be learning Python 3 exclusively.</a:t>
             </a:r>
           </a:p>
@@ -8131,7 +8062,7 @@
           </a:p>
           <a:p>
             <a:r>
-              <a:rPr lang="en-GB" b="1" u="sng" dirty="0" smtClean="0">
+              <a:rPr lang="en-GB" b="1" u="sng" dirty="0">
                 <a:solidFill>
                   <a:srgbClr val="FFFF00"/>
                 </a:solidFill>
@@ -8139,7 +8070,7 @@
               <a:t>KEY FACT:</a:t>
             </a:r>
             <a:r>
-              <a:rPr lang="en-GB" b="1" dirty="0" smtClean="0">
+              <a:rPr lang="en-GB" b="1" dirty="0">
                 <a:solidFill>
                   <a:srgbClr val="FFFF00"/>
                 </a:solidFill>
@@ -8147,7 +8078,7 @@
               <a:t> </a:t>
             </a:r>
             <a:r>
-              <a:rPr lang="en-GB" dirty="0" smtClean="0">
+              <a:rPr lang="en-GB" dirty="0">
                 <a:solidFill>
                   <a:srgbClr val="FFFF00"/>
                 </a:solidFill>
@@ -8208,10 +8139,9 @@
           <a:lstStyle/>
           <a:p>
             <a:r>
-              <a:rPr lang="en-GB" dirty="0" smtClean="0"/>
+              <a:rPr lang="en-GB" dirty="0"/>
               <a:t>Getting Python 3</a:t>
             </a:r>
-            <a:endParaRPr lang="en-GB" dirty="0"/>
           </a:p>
         </p:txBody>
       </p:sp>
@@ -8238,7 +8168,7 @@
           <a:lstStyle/>
           <a:p>
             <a:r>
-              <a:rPr lang="en-GB" dirty="0" smtClean="0"/>
+              <a:rPr lang="en-GB" dirty="0"/>
               <a:t>On Windows, you should install Python3 from :-</a:t>
             </a:r>
           </a:p>
@@ -8248,13 +8178,7 @@
               <a:rPr lang="en-GB" sz="1400" dirty="0">
                 <a:hlinkClick r:id="rId2"/>
               </a:rPr>
-              <a:t>https://www.python.org/downloads</a:t>
-            </a:r>
-            <a:r>
-              <a:rPr lang="en-GB" sz="1400" dirty="0" smtClean="0">
-                <a:hlinkClick r:id="rId2"/>
-              </a:rPr>
-              <a:t>/</a:t>
+              <a:t>https://www.python.org/downloads/</a:t>
             </a:r>
             <a:endParaRPr lang="en-GB" sz="1400" dirty="0"/>
           </a:p>
@@ -8264,7 +8188,7 @@
           </a:p>
           <a:p>
             <a:r>
-              <a:rPr lang="en-GB" b="1" u="sng" dirty="0" smtClean="0">
+              <a:rPr lang="en-GB" b="1" u="sng" dirty="0">
                 <a:solidFill>
                   <a:srgbClr val="FFFF00"/>
                 </a:solidFill>
@@ -8272,7 +8196,7 @@
               <a:t>ACTION:</a:t>
             </a:r>
             <a:r>
-              <a:rPr lang="en-GB" b="1" dirty="0" smtClean="0">
+              <a:rPr lang="en-GB" b="1" dirty="0">
                 <a:solidFill>
                   <a:srgbClr val="FFFF00"/>
                 </a:solidFill>
@@ -8280,7 +8204,7 @@
               <a:t> </a:t>
             </a:r>
             <a:r>
-              <a:rPr lang="en-GB" dirty="0" smtClean="0">
+              <a:rPr lang="en-GB" dirty="0">
                 <a:solidFill>
                   <a:srgbClr val="FFFF00"/>
                 </a:solidFill>
@@ -8360,10 +8284,9 @@
           <a:lstStyle/>
           <a:p>
             <a:r>
-              <a:rPr lang="en-GB" dirty="0" smtClean="0"/>
+              <a:rPr lang="en-GB" dirty="0"/>
               <a:t>Hello World !</a:t>
             </a:r>
-            <a:endParaRPr lang="en-GB" dirty="0"/>
           </a:p>
         </p:txBody>
       </p:sp>
@@ -8383,36 +8306,35 @@
           <a:lstStyle/>
           <a:p>
             <a:r>
-              <a:rPr lang="en-GB" dirty="0" smtClean="0"/>
+              <a:rPr lang="en-GB" dirty="0"/>
               <a:t>Computer programmers traditionally use “Hello World” as the first program they write in any programming language.</a:t>
             </a:r>
           </a:p>
           <a:p>
             <a:r>
-              <a:rPr lang="en-GB" dirty="0" smtClean="0"/>
+              <a:rPr lang="en-GB" dirty="0"/>
               <a:t>It simply prints “Hello World” on the screen.</a:t>
             </a:r>
           </a:p>
           <a:p>
             <a:r>
-              <a:rPr lang="en-GB" dirty="0" smtClean="0"/>
+              <a:rPr lang="en-GB" dirty="0"/>
               <a:t>It proves several things :-</a:t>
             </a:r>
           </a:p>
           <a:p>
             <a:pPr lvl="1"/>
             <a:r>
-              <a:rPr lang="en-GB" dirty="0" smtClean="0"/>
+              <a:rPr lang="en-GB" dirty="0"/>
               <a:t>You can write, save, and run a simple program.</a:t>
             </a:r>
           </a:p>
           <a:p>
             <a:pPr lvl="1"/>
             <a:r>
-              <a:rPr lang="en-GB" dirty="0" smtClean="0"/>
+              <a:rPr lang="en-GB" dirty="0"/>
               <a:t>You have installed Python correctly.</a:t>
             </a:r>
-            <a:endParaRPr lang="en-GB" dirty="0"/>
           </a:p>
         </p:txBody>
       </p:sp>
@@ -8462,10 +8384,9 @@
           <a:lstStyle/>
           <a:p>
             <a:r>
-              <a:rPr lang="en-GB" dirty="0" smtClean="0"/>
+              <a:rPr lang="en-GB" dirty="0"/>
               <a:t>What tools to use to write programs.</a:t>
             </a:r>
-            <a:endParaRPr lang="en-GB" dirty="0"/>
           </a:p>
         </p:txBody>
       </p:sp>
@@ -8485,19 +8406,19 @@
           <a:lstStyle/>
           <a:p>
             <a:r>
-              <a:rPr lang="en-GB" dirty="0" smtClean="0"/>
+              <a:rPr lang="en-GB" dirty="0"/>
               <a:t>You can write programs with any text editor.</a:t>
             </a:r>
           </a:p>
           <a:p>
             <a:r>
-              <a:rPr lang="en-GB" dirty="0" smtClean="0"/>
+              <a:rPr lang="en-GB" dirty="0"/>
               <a:t>Later today, you will get a better tool, but this will show you that you don’t need anything fancy to write a program (but it can help make it easier !).</a:t>
             </a:r>
           </a:p>
           <a:p>
             <a:r>
-              <a:rPr lang="en-GB" dirty="0" smtClean="0"/>
+              <a:rPr lang="en-GB" dirty="0"/>
               <a:t>We will write our first program using notepad that comes with Windows.</a:t>
             </a:r>
           </a:p>
@@ -8505,14 +8426,14 @@
             <a:pPr marL="0" indent="0">
               <a:buNone/>
             </a:pPr>
-            <a:endParaRPr lang="en-GB" dirty="0" smtClean="0"/>
+            <a:endParaRPr lang="en-GB" dirty="0"/>
           </a:p>
           <a:p>
             <a:pPr marL="0" indent="0">
               <a:buNone/>
             </a:pPr>
             <a:r>
-              <a:rPr lang="en-GB" b="1" u="sng" dirty="0" smtClean="0">
+              <a:rPr lang="en-GB" b="1" u="sng" dirty="0">
                 <a:solidFill>
                   <a:srgbClr val="FFFF00"/>
                 </a:solidFill>
@@ -8520,7 +8441,7 @@
               <a:t>ACTION:</a:t>
             </a:r>
             <a:r>
-              <a:rPr lang="en-GB" b="1" dirty="0" smtClean="0">
+              <a:rPr lang="en-GB" b="1" dirty="0">
                 <a:solidFill>
                   <a:srgbClr val="FFFF00"/>
                 </a:solidFill>
@@ -8528,7 +8449,7 @@
               <a:t> </a:t>
             </a:r>
             <a:r>
-              <a:rPr lang="en-GB" dirty="0" smtClean="0">
+              <a:rPr lang="en-GB" dirty="0">
                 <a:solidFill>
                   <a:srgbClr val="FFFF00"/>
                 </a:solidFill>
@@ -8589,10 +8510,9 @@
           <a:lstStyle/>
           <a:p>
             <a:r>
-              <a:rPr lang="en-GB" dirty="0" smtClean="0"/>
+              <a:rPr lang="en-GB" dirty="0"/>
               <a:t>Your first program.</a:t>
             </a:r>
-            <a:endParaRPr lang="en-GB" dirty="0"/>
           </a:p>
         </p:txBody>
       </p:sp>
@@ -8846,7 +8766,7 @@
           </a:lstStyle>
           <a:p>
             <a:r>
-              <a:rPr lang="en-GB" dirty="0" smtClean="0">
+              <a:rPr lang="en-GB" dirty="0">
                 <a:latin typeface="+mn-lt"/>
                 <a:cs typeface="Courier New" panose="02070309020205020404" pitchFamily="49" charset="0"/>
               </a:rPr>
@@ -8855,7 +8775,7 @@
           </a:p>
           <a:p>
             <a:r>
-              <a:rPr lang="en-GB" dirty="0" smtClean="0">
+              <a:rPr lang="en-GB" dirty="0">
                 <a:latin typeface="+mn-lt"/>
                 <a:cs typeface="Courier New" panose="02070309020205020404" pitchFamily="49" charset="0"/>
               </a:rPr>
@@ -8864,7 +8784,7 @@
           </a:p>
           <a:p>
             <a:r>
-              <a:rPr lang="en-GB" dirty="0" smtClean="0">
+              <a:rPr lang="en-GB" dirty="0">
                 <a:latin typeface="+mn-lt"/>
                 <a:cs typeface="Courier New" panose="02070309020205020404" pitchFamily="49" charset="0"/>
               </a:rPr>
@@ -8874,7 +8794,7 @@
           <a:p>
             <a:pPr lvl="1"/>
             <a:r>
-              <a:rPr lang="en-GB" dirty="0" smtClean="0">
+              <a:rPr lang="en-GB" dirty="0">
                 <a:latin typeface="+mn-lt"/>
                 <a:cs typeface="Courier New" panose="02070309020205020404" pitchFamily="49" charset="0"/>
               </a:rPr>
@@ -8883,7 +8803,7 @@
           </a:p>
           <a:p>
             <a:r>
-              <a:rPr lang="en-GB" b="1" u="sng" dirty="0" smtClean="0">
+              <a:rPr lang="en-GB" b="1" u="sng" dirty="0">
                 <a:solidFill>
                   <a:srgbClr val="FFFF00"/>
                 </a:solidFill>
@@ -8893,7 +8813,7 @@
               <a:t>Action:</a:t>
             </a:r>
             <a:r>
-              <a:rPr lang="en-GB" b="1" dirty="0" smtClean="0">
+              <a:rPr lang="en-GB" b="1" dirty="0">
                 <a:solidFill>
                   <a:srgbClr val="FFFF00"/>
                 </a:solidFill>
@@ -8903,7 +8823,7 @@
               <a:t> </a:t>
             </a:r>
             <a:r>
-              <a:rPr lang="en-GB" dirty="0" smtClean="0">
+              <a:rPr lang="en-GB" dirty="0">
                 <a:solidFill>
                   <a:srgbClr val="FFFF00"/>
                 </a:solidFill>
@@ -8991,10 +8911,9 @@
           <a:lstStyle/>
           <a:p>
             <a:r>
-              <a:rPr lang="en-GB" dirty="0" smtClean="0"/>
+              <a:rPr lang="en-GB" dirty="0"/>
               <a:t>Saving your program.</a:t>
             </a:r>
-            <a:endParaRPr lang="en-GB" dirty="0"/>
           </a:p>
         </p:txBody>
       </p:sp>
@@ -9248,7 +9167,7 @@
           </a:lstStyle>
           <a:p>
             <a:r>
-              <a:rPr lang="en-GB" dirty="0" smtClean="0">
+              <a:rPr lang="en-GB" dirty="0">
                 <a:latin typeface="+mn-lt"/>
                 <a:cs typeface="Courier New" panose="02070309020205020404" pitchFamily="49" charset="0"/>
               </a:rPr>
@@ -9257,14 +9176,14 @@
           </a:p>
           <a:p>
             <a:r>
-              <a:rPr lang="en-GB" dirty="0" smtClean="0">
+              <a:rPr lang="en-GB" dirty="0">
                 <a:latin typeface="+mn-lt"/>
                 <a:cs typeface="Courier New" panose="02070309020205020404" pitchFamily="49" charset="0"/>
               </a:rPr>
               <a:t>Like with other things, use the “File” </a:t>
             </a:r>
             <a:r>
-              <a:rPr lang="en-GB" dirty="0" smtClean="0">
+              <a:rPr lang="en-GB" dirty="0">
                 <a:latin typeface="+mn-lt"/>
                 <a:cs typeface="Courier New" panose="02070309020205020404" pitchFamily="49" charset="0"/>
                 <a:sym typeface="Wingdings" panose="05000000000000000000" pitchFamily="2" charset="2"/>
@@ -9274,7 +9193,7 @@
           </a:p>
           <a:p>
             <a:r>
-              <a:rPr lang="en-GB" dirty="0" smtClean="0">
+              <a:rPr lang="en-GB" dirty="0">
                 <a:latin typeface="+mn-lt"/>
                 <a:cs typeface="Courier New" panose="02070309020205020404" pitchFamily="49" charset="0"/>
                 <a:sym typeface="Wingdings" panose="05000000000000000000" pitchFamily="2" charset="2"/>
@@ -9284,21 +9203,21 @@
           </a:p>
           <a:p>
             <a:r>
-              <a:rPr lang="en-GB" dirty="0" smtClean="0">
+              <a:rPr lang="en-GB" dirty="0">
                 <a:latin typeface="+mn-lt"/>
                 <a:cs typeface="Courier New" panose="02070309020205020404" pitchFamily="49" charset="0"/>
                 <a:sym typeface="Wingdings" panose="05000000000000000000" pitchFamily="2" charset="2"/>
               </a:rPr>
               <a:t>You should save it in “This PC” -&gt; “Documents”.</a:t>
             </a:r>
-            <a:endParaRPr lang="en-GB" dirty="0" smtClean="0">
+            <a:endParaRPr lang="en-GB" dirty="0">
               <a:latin typeface="+mn-lt"/>
               <a:cs typeface="Courier New" panose="02070309020205020404" pitchFamily="49" charset="0"/>
             </a:endParaRPr>
           </a:p>
           <a:p>
             <a:r>
-              <a:rPr lang="en-GB" b="1" u="sng" dirty="0" smtClean="0">
+              <a:rPr lang="en-GB" b="1" u="sng" dirty="0">
                 <a:solidFill>
                   <a:srgbClr val="FFFF00"/>
                 </a:solidFill>
@@ -9308,7 +9227,7 @@
               <a:t>Action:</a:t>
             </a:r>
             <a:r>
-              <a:rPr lang="en-GB" b="1" dirty="0" smtClean="0">
+              <a:rPr lang="en-GB" b="1" dirty="0">
                 <a:solidFill>
                   <a:srgbClr val="FFFF00"/>
                 </a:solidFill>
@@ -9318,7 +9237,7 @@
               <a:t> </a:t>
             </a:r>
             <a:r>
-              <a:rPr lang="en-GB" dirty="0" smtClean="0">
+              <a:rPr lang="en-GB" dirty="0">
                 <a:solidFill>
                   <a:srgbClr val="FFFF00"/>
                 </a:solidFill>
@@ -9406,10 +9325,9 @@
           <a:lstStyle/>
           <a:p>
             <a:r>
-              <a:rPr lang="en-GB" dirty="0" smtClean="0"/>
+              <a:rPr lang="en-GB" dirty="0"/>
               <a:t>Running your program</a:t>
             </a:r>
-            <a:endParaRPr lang="en-GB" dirty="0"/>
           </a:p>
         </p:txBody>
       </p:sp>
@@ -9434,22 +9352,22 @@
           <a:lstStyle/>
           <a:p>
             <a:r>
-              <a:rPr lang="en-GB" dirty="0" smtClean="0"/>
+              <a:rPr lang="en-GB" dirty="0"/>
               <a:t>You can use the command prompt to run Python programs.</a:t>
             </a:r>
           </a:p>
           <a:p>
             <a:r>
-              <a:rPr lang="en-GB" dirty="0" smtClean="0"/>
+              <a:rPr lang="en-GB" dirty="0"/>
               <a:t>The command prompt has many other uses – and later in this course we will find other uses.</a:t>
             </a:r>
           </a:p>
           <a:p>
-            <a:endParaRPr lang="en-GB" dirty="0" smtClean="0"/>
-          </a:p>
-          <a:p>
-            <a:r>
-              <a:rPr lang="en-GB" b="1" u="sng" dirty="0" smtClean="0">
+            <a:endParaRPr lang="en-GB" dirty="0"/>
+          </a:p>
+          <a:p>
+            <a:r>
+              <a:rPr lang="en-GB" b="1" u="sng" dirty="0">
                 <a:solidFill>
                   <a:srgbClr val="FFFF00"/>
                 </a:solidFill>
@@ -9457,7 +9375,7 @@
               <a:t>ACTION:</a:t>
             </a:r>
             <a:r>
-              <a:rPr lang="en-GB" b="1" dirty="0" smtClean="0">
+              <a:rPr lang="en-GB" b="1" dirty="0">
                 <a:solidFill>
                   <a:srgbClr val="FFFF00"/>
                 </a:solidFill>
@@ -9465,7 +9383,7 @@
               <a:t> </a:t>
             </a:r>
             <a:r>
-              <a:rPr lang="en-GB" dirty="0" smtClean="0">
+              <a:rPr lang="en-GB" dirty="0">
                 <a:solidFill>
                   <a:srgbClr val="FFFF00"/>
                 </a:solidFill>
@@ -9475,7 +9393,7 @@
           </a:p>
           <a:p>
             <a:r>
-              <a:rPr lang="en-GB" b="1" u="sng" dirty="0" smtClean="0">
+              <a:rPr lang="en-GB" b="1" u="sng" dirty="0">
                 <a:solidFill>
                   <a:srgbClr val="FFFF00"/>
                 </a:solidFill>
@@ -9483,7 +9401,7 @@
               <a:t>CHECK:</a:t>
             </a:r>
             <a:r>
-              <a:rPr lang="en-GB" b="1" dirty="0" smtClean="0">
+              <a:rPr lang="en-GB" b="1" dirty="0">
                 <a:solidFill>
                   <a:srgbClr val="FFFF00"/>
                 </a:solidFill>
@@ -9491,7 +9409,7 @@
               <a:t> </a:t>
             </a:r>
             <a:r>
-              <a:rPr lang="en-GB" dirty="0" smtClean="0">
+              <a:rPr lang="en-GB" dirty="0">
                 <a:solidFill>
                   <a:srgbClr val="FFFF00"/>
                 </a:solidFill>

</xml_diff>